<commit_message>
docs: Actualización de partes de la documentación del cuarto trimestre con lo avanzado en cuanto a código comparado a documentación pasada
</commit_message>
<xml_diff>
--- a/Documentación-GymSenApp/4 Trim/Proyecto GymSenApp T4.pptx
+++ b/Documentación-GymSenApp/4 Trim/Proyecto GymSenApp T4.pptx
@@ -356,7 +356,7 @@
           <a:p>
             <a:fld id="{9477F811-659D-4E71-8A1E-FE6E55EB0BAC}" type="datetimeFigureOut">
               <a:rPr lang="es-CO" smtClean="0"/>
-              <a:t>26/06/2023</a:t>
+              <a:t>13/07/2023</a:t>
             </a:fld>
             <a:endParaRPr lang="es-CO"/>
           </a:p>
@@ -1297,7 +1297,7 @@
           <a:p>
             <a:fld id="{B3030C24-9424-B24A-8613-79990C3AA492}" type="datetimeFigureOut">
               <a:rPr lang="es-ES" smtClean="0"/>
-              <a:t>26/06/2023</a:t>
+              <a:t>13/07/2023</a:t>
             </a:fld>
             <a:endParaRPr lang="es-ES"/>
           </a:p>
@@ -1477,7 +1477,7 @@
           <a:p>
             <a:fld id="{B3030C24-9424-B24A-8613-79990C3AA492}" type="datetimeFigureOut">
               <a:rPr lang="es-ES" smtClean="0"/>
-              <a:t>26/06/2023</a:t>
+              <a:t>13/07/2023</a:t>
             </a:fld>
             <a:endParaRPr lang="es-ES"/>
           </a:p>
@@ -2114,7 +2114,7 @@
           <a:p>
             <a:fld id="{B3030C24-9424-B24A-8613-79990C3AA492}" type="datetimeFigureOut">
               <a:rPr lang="es-ES" smtClean="0"/>
-              <a:t>26/06/2023</a:t>
+              <a:t>13/07/2023</a:t>
             </a:fld>
             <a:endParaRPr lang="es-ES"/>
           </a:p>
@@ -2367,7 +2367,7 @@
           <a:p>
             <a:fld id="{B3030C24-9424-B24A-8613-79990C3AA492}" type="datetimeFigureOut">
               <a:rPr lang="es-ES" smtClean="0"/>
-              <a:t>26/06/2023</a:t>
+              <a:t>13/07/2023</a:t>
             </a:fld>
             <a:endParaRPr lang="es-ES"/>
           </a:p>
@@ -2580,7 +2580,7 @@
           <a:p>
             <a:fld id="{B3030C24-9424-B24A-8613-79990C3AA492}" type="datetimeFigureOut">
               <a:rPr lang="es-ES" smtClean="0"/>
-              <a:t>26/06/2023</a:t>
+              <a:t>13/07/2023</a:t>
             </a:fld>
             <a:endParaRPr lang="es-ES"/>
           </a:p>
@@ -3962,20 +3962,14 @@
           <p:nvPr/>
         </p:nvPicPr>
         <p:blipFill rotWithShape="1">
-          <a:blip r:embed="rId2">
-            <a:extLst>
-              <a:ext uri="{28A0092B-C50C-407E-A947-70E740481C1C}">
-                <a14:useLocalDpi xmlns:a14="http://schemas.microsoft.com/office/drawing/2010/main" val="0"/>
-              </a:ext>
-            </a:extLst>
-          </a:blip>
-          <a:srcRect t="40029" r="21066"/>
+          <a:blip r:embed="rId2"/>
+          <a:srcRect l="-49" r="-272"/>
           <a:stretch/>
         </p:blipFill>
         <p:spPr>
           <a:xfrm>
-            <a:off x="1195354" y="2512376"/>
-            <a:ext cx="3084696" cy="962234"/>
+            <a:off x="1195353" y="2562038"/>
+            <a:ext cx="3084697" cy="912571"/>
           </a:xfrm>
           <a:prstGeom prst="rect">
             <a:avLst/>
@@ -4068,14 +4062,13 @@
         </p:nvPicPr>
         <p:blipFill>
           <a:blip r:embed="rId3"/>
-          <a:stretch>
-            <a:fillRect/>
-          </a:stretch>
+          <a:srcRect/>
+          <a:stretch/>
         </p:blipFill>
         <p:spPr>
           <a:xfrm>
             <a:off x="1195354" y="1718440"/>
-            <a:ext cx="3084696" cy="557102"/>
+            <a:ext cx="3084696" cy="664716"/>
           </a:xfrm>
           <a:prstGeom prst="rect">
             <a:avLst/>
@@ -4965,7 +4958,7 @@
         </p:nvSpPr>
         <p:spPr>
           <a:xfrm>
-            <a:off x="2939478" y="1319856"/>
+            <a:off x="2939478" y="1168660"/>
             <a:ext cx="3265043" cy="307777"/>
           </a:xfrm>
           <a:prstGeom prst="rect">
@@ -5016,13 +5009,13 @@
         </p:nvPicPr>
         <p:blipFill rotWithShape="1">
           <a:blip r:embed="rId2"/>
-          <a:srcRect t="42968"/>
+          <a:srcRect l="275" r="275"/>
           <a:stretch/>
         </p:blipFill>
         <p:spPr>
           <a:xfrm>
-            <a:off x="794922" y="2777683"/>
-            <a:ext cx="7554154" cy="1189712"/>
+            <a:off x="422726" y="2989925"/>
+            <a:ext cx="8298545" cy="1062112"/>
           </a:xfrm>
           <a:prstGeom prst="rect">
             <a:avLst/>
@@ -5045,14 +5038,13 @@
         </p:nvPicPr>
         <p:blipFill>
           <a:blip r:embed="rId3"/>
-          <a:stretch>
-            <a:fillRect/>
-          </a:stretch>
+          <a:srcRect/>
+          <a:stretch/>
         </p:blipFill>
         <p:spPr>
           <a:xfrm>
-            <a:off x="1478398" y="1773384"/>
-            <a:ext cx="6187204" cy="857263"/>
+            <a:off x="1478398" y="1741182"/>
+            <a:ext cx="6187204" cy="827400"/>
           </a:xfrm>
           <a:prstGeom prst="rect">
             <a:avLst/>
@@ -5724,8 +5716,8 @@
         </p:blipFill>
         <p:spPr>
           <a:xfrm>
-            <a:off x="4526112" y="2793454"/>
-            <a:ext cx="3583171" cy="1788769"/>
+            <a:off x="4526112" y="2993314"/>
+            <a:ext cx="3821822" cy="1377520"/>
           </a:xfrm>
           <a:prstGeom prst="rect">
             <a:avLst/>
@@ -6242,7 +6234,7 @@
         </p:nvSpPr>
         <p:spPr>
           <a:xfrm>
-            <a:off x="686904" y="1495334"/>
+            <a:off x="686904" y="1516870"/>
             <a:ext cx="7770192" cy="307777"/>
           </a:xfrm>
           <a:prstGeom prst="rect">
@@ -6333,8 +6325,8 @@
         </p:blipFill>
         <p:spPr>
           <a:xfrm>
-            <a:off x="925311" y="2055885"/>
-            <a:ext cx="7293378" cy="931643"/>
+            <a:off x="746505" y="2231250"/>
+            <a:ext cx="7650989" cy="673315"/>
           </a:xfrm>
           <a:prstGeom prst="rect">
             <a:avLst/>
@@ -6879,8 +6871,8 @@
         </p:blipFill>
         <p:spPr>
           <a:xfrm>
-            <a:off x="1010650" y="2041357"/>
-            <a:ext cx="7122700" cy="1493900"/>
+            <a:off x="1010650" y="2158263"/>
+            <a:ext cx="7122700" cy="1260087"/>
           </a:xfrm>
           <a:prstGeom prst="rect">
             <a:avLst/>
@@ -7405,8 +7397,8 @@
         </p:blipFill>
         <p:spPr>
           <a:xfrm>
-            <a:off x="2299275" y="2060057"/>
-            <a:ext cx="4545450" cy="1680598"/>
+            <a:off x="2299275" y="2215001"/>
+            <a:ext cx="4545450" cy="1370709"/>
           </a:xfrm>
           <a:prstGeom prst="rect">
             <a:avLst/>
@@ -7794,8 +7786,8 @@
         </p:nvSpPr>
         <p:spPr>
           <a:xfrm>
-            <a:off x="1032193" y="1089125"/>
-            <a:ext cx="7031480" cy="738664"/>
+            <a:off x="1065008" y="1089125"/>
+            <a:ext cx="6998665" cy="738664"/>
           </a:xfrm>
           <a:prstGeom prst="rect">
             <a:avLst/>
@@ -7970,13 +7962,13 @@
         </p:nvPicPr>
         <p:blipFill rotWithShape="1">
           <a:blip r:embed="rId2"/>
-          <a:srcRect t="575" b="63"/>
+          <a:srcRect l="-338" r="-119"/>
           <a:stretch/>
         </p:blipFill>
         <p:spPr bwMode="auto">
           <a:xfrm>
-            <a:off x="1462624" y="1994398"/>
-            <a:ext cx="6218752" cy="2642628"/>
+            <a:off x="1072667" y="1994398"/>
+            <a:ext cx="6998665" cy="2642628"/>
           </a:xfrm>
           <a:prstGeom prst="rect">
             <a:avLst/>
@@ -8466,8 +8458,8 @@
         </p:blipFill>
         <p:spPr>
           <a:xfrm>
-            <a:off x="918184" y="2309256"/>
-            <a:ext cx="7307631" cy="985732"/>
+            <a:off x="918184" y="2389031"/>
+            <a:ext cx="7307631" cy="826181"/>
           </a:xfrm>
           <a:prstGeom prst="rect">
             <a:avLst/>
@@ -8950,13 +8942,13 @@
         </p:nvPicPr>
         <p:blipFill rotWithShape="1">
           <a:blip r:embed="rId2"/>
-          <a:srcRect b="68072"/>
+          <a:srcRect l="-71" r="53"/>
           <a:stretch/>
         </p:blipFill>
         <p:spPr>
           <a:xfrm>
-            <a:off x="1177556" y="1865447"/>
-            <a:ext cx="6788887" cy="563526"/>
+            <a:off x="768476" y="1925101"/>
+            <a:ext cx="7544954" cy="478927"/>
           </a:xfrm>
           <a:prstGeom prst="rect">
             <a:avLst/>
@@ -8979,14 +8971,13 @@
         </p:nvPicPr>
         <p:blipFill>
           <a:blip r:embed="rId3"/>
-          <a:stretch>
-            <a:fillRect/>
-          </a:stretch>
+          <a:srcRect/>
+          <a:stretch/>
         </p:blipFill>
         <p:spPr>
           <a:xfrm>
-            <a:off x="1177556" y="2795048"/>
-            <a:ext cx="4001058" cy="161948"/>
+            <a:off x="768476" y="2795048"/>
+            <a:ext cx="3953430" cy="161948"/>
           </a:xfrm>
           <a:prstGeom prst="rect">
             <a:avLst/>
@@ -9006,14 +8997,14 @@
           <p:nvPr/>
         </p:nvPicPr>
         <p:blipFill rotWithShape="1">
-          <a:blip r:embed="rId2"/>
-          <a:srcRect t="59671" b="8401"/>
+          <a:blip r:embed="rId4"/>
+          <a:srcRect l="-123" r="56"/>
           <a:stretch/>
         </p:blipFill>
         <p:spPr>
           <a:xfrm>
-            <a:off x="1177556" y="3323071"/>
-            <a:ext cx="6788887" cy="563526"/>
+            <a:off x="768476" y="3348016"/>
+            <a:ext cx="7607048" cy="538580"/>
           </a:xfrm>
           <a:prstGeom prst="rect">
             <a:avLst/>
@@ -9953,13 +9944,13 @@
         </p:nvPicPr>
         <p:blipFill rotWithShape="1">
           <a:blip r:embed="rId2"/>
-          <a:srcRect t="1" b="68752"/>
+          <a:srcRect l="1" t="-1087" r="26529" b="1087"/>
           <a:stretch/>
         </p:blipFill>
         <p:spPr>
           <a:xfrm>
-            <a:off x="1233752" y="2136741"/>
-            <a:ext cx="6676496" cy="615152"/>
+            <a:off x="1233752" y="2164271"/>
+            <a:ext cx="6676496" cy="587622"/>
           </a:xfrm>
           <a:prstGeom prst="rect">
             <a:avLst/>
@@ -9982,14 +9973,13 @@
         </p:nvPicPr>
         <p:blipFill>
           <a:blip r:embed="rId3"/>
-          <a:stretch>
-            <a:fillRect/>
-          </a:stretch>
+          <a:srcRect/>
+          <a:stretch/>
         </p:blipFill>
         <p:spPr>
           <a:xfrm>
-            <a:off x="1249547" y="2979229"/>
-            <a:ext cx="6676496" cy="143581"/>
+            <a:off x="1233751" y="2979229"/>
+            <a:ext cx="6676496" cy="152102"/>
           </a:xfrm>
           <a:prstGeom prst="rect">
             <a:avLst/>
@@ -10009,14 +9999,14 @@
           <p:nvPr/>
         </p:nvPicPr>
         <p:blipFill rotWithShape="1">
-          <a:blip r:embed="rId2"/>
-          <a:srcRect t="60379" b="8433"/>
+          <a:blip r:embed="rId4"/>
+          <a:srcRect r="16249"/>
           <a:stretch/>
         </p:blipFill>
         <p:spPr>
           <a:xfrm>
             <a:off x="1233751" y="3382640"/>
-            <a:ext cx="6692291" cy="615152"/>
+            <a:ext cx="6676495" cy="586932"/>
           </a:xfrm>
           <a:prstGeom prst="rect">
             <a:avLst/>
@@ -10639,13 +10629,13 @@
         </p:nvPicPr>
         <p:blipFill rotWithShape="1">
           <a:blip r:embed="rId3"/>
-          <a:srcRect b="53785"/>
+          <a:srcRect l="-79" r="-79"/>
           <a:stretch/>
         </p:blipFill>
         <p:spPr>
           <a:xfrm>
-            <a:off x="2211184" y="1920254"/>
-            <a:ext cx="4721632" cy="812313"/>
+            <a:off x="2006798" y="2037641"/>
+            <a:ext cx="5130403" cy="688098"/>
           </a:xfrm>
           <a:prstGeom prst="rect">
             <a:avLst/>
@@ -10665,7 +10655,7 @@
           <p:nvPr/>
         </p:nvPicPr>
         <p:blipFill rotWithShape="1">
-          <a:blip r:embed="rId3"/>
+          <a:blip r:embed="rId4"/>
           <a:srcRect t="78800"/>
           <a:stretch/>
         </p:blipFill>
@@ -10694,7 +10684,7 @@
           <p:nvPr/>
         </p:nvPicPr>
         <p:blipFill>
-          <a:blip r:embed="rId4"/>
+          <a:blip r:embed="rId5"/>
           <a:stretch>
             <a:fillRect/>
           </a:stretch>
@@ -11278,14 +11268,13 @@
         </p:nvPicPr>
         <p:blipFill>
           <a:blip r:embed="rId3"/>
-          <a:stretch>
-            <a:fillRect/>
-          </a:stretch>
+          <a:srcRect/>
+          <a:stretch/>
         </p:blipFill>
         <p:spPr>
           <a:xfrm>
-            <a:off x="851305" y="1803870"/>
-            <a:ext cx="7441390" cy="1148131"/>
+            <a:off x="545804" y="1964982"/>
+            <a:ext cx="8052392" cy="893721"/>
           </a:xfrm>
           <a:prstGeom prst="rect">
             <a:avLst/>
@@ -11314,7 +11303,7 @@
         </p:blipFill>
         <p:spPr>
           <a:xfrm>
-            <a:off x="2479882" y="3454353"/>
+            <a:off x="2441382" y="3454353"/>
             <a:ext cx="1996427" cy="204181"/>
           </a:xfrm>
           <a:prstGeom prst="rect">
@@ -11343,7 +11332,7 @@
         </p:blipFill>
         <p:spPr>
           <a:xfrm>
-            <a:off x="4667691" y="3454353"/>
+            <a:off x="4629191" y="3454353"/>
             <a:ext cx="2213669" cy="204181"/>
           </a:xfrm>
           <a:prstGeom prst="rect">
@@ -11370,8 +11359,8 @@
         </p:nvSpPr>
         <p:spPr>
           <a:xfrm>
-            <a:off x="4178598" y="1892594"/>
-            <a:ext cx="489094" cy="210883"/>
+            <a:off x="3917481" y="1997027"/>
+            <a:ext cx="429888" cy="228198"/>
           </a:xfrm>
           <a:prstGeom prst="ellipse">
             <a:avLst/>
@@ -15390,8 +15379,8 @@
         </p:blipFill>
         <p:spPr>
           <a:xfrm>
-            <a:off x="1024759" y="1070816"/>
-            <a:ext cx="7046347" cy="3397218"/>
+            <a:off x="1365336" y="1024186"/>
+            <a:ext cx="6413327" cy="3758210"/>
           </a:xfrm>
           <a:prstGeom prst="rect">
             <a:avLst/>
@@ -17214,13 +17203,13 @@
         </p:nvPicPr>
         <p:blipFill rotWithShape="1">
           <a:blip r:embed="rId2"/>
-          <a:srcRect t="963" b="17225"/>
+          <a:srcRect t="-915" b="873"/>
           <a:stretch/>
         </p:blipFill>
         <p:spPr>
           <a:xfrm>
-            <a:off x="4432274" y="3276013"/>
-            <a:ext cx="3869037" cy="911150"/>
+            <a:off x="4432274" y="3206926"/>
+            <a:ext cx="3869037" cy="1030882"/>
           </a:xfrm>
           <a:prstGeom prst="rect">
             <a:avLst/>
@@ -17291,8 +17280,8 @@
         </p:blipFill>
         <p:spPr>
           <a:xfrm>
-            <a:off x="5024950" y="1539095"/>
-            <a:ext cx="2513563" cy="973778"/>
+            <a:off x="5165530" y="1539095"/>
+            <a:ext cx="2232402" cy="973778"/>
           </a:xfrm>
           <a:prstGeom prst="rect">
             <a:avLst/>
@@ -17315,13 +17304,13 @@
         </p:nvPicPr>
         <p:blipFill rotWithShape="1">
           <a:blip r:embed="rId4"/>
-          <a:srcRect l="2081"/>
+          <a:srcRect t="-1582" b="2202"/>
           <a:stretch/>
         </p:blipFill>
         <p:spPr>
           <a:xfrm>
-            <a:off x="2311971" y="1496137"/>
-            <a:ext cx="1096011" cy="1059695"/>
+            <a:off x="2311971" y="1431158"/>
+            <a:ext cx="1096011" cy="1189652"/>
           </a:xfrm>
           <a:prstGeom prst="rect">
             <a:avLst/>
@@ -17345,9 +17334,9 @@
           <p:nvPr/>
         </p:nvCxnSpPr>
         <p:spPr>
-          <a:xfrm flipV="1">
+          <a:xfrm>
             <a:off x="3407982" y="2025984"/>
-            <a:ext cx="1616968" cy="1"/>
+            <a:ext cx="1757548" cy="0"/>
           </a:xfrm>
           <a:prstGeom prst="straightConnector1">
             <a:avLst/>
@@ -17390,8 +17379,8 @@
         </p:nvCxnSpPr>
         <p:spPr>
           <a:xfrm>
-            <a:off x="2859977" y="2555832"/>
-            <a:ext cx="0" cy="514317"/>
+            <a:off x="2859977" y="2620810"/>
+            <a:ext cx="0" cy="449339"/>
           </a:xfrm>
           <a:prstGeom prst="straightConnector1">
             <a:avLst/>
@@ -17433,9 +17422,9 @@
           <p:nvPr/>
         </p:nvCxnSpPr>
         <p:spPr>
-          <a:xfrm>
-            <a:off x="3764456" y="3731588"/>
-            <a:ext cx="667818" cy="0"/>
+          <a:xfrm flipV="1">
+            <a:off x="3764456" y="3722367"/>
+            <a:ext cx="667818" cy="9221"/>
           </a:xfrm>
           <a:prstGeom prst="straightConnector1">
             <a:avLst/>
@@ -18915,14 +18904,13 @@
         </p:nvPicPr>
         <p:blipFill>
           <a:blip r:embed="rId3"/>
-          <a:stretch>
-            <a:fillRect/>
-          </a:stretch>
+          <a:srcRect/>
+          <a:stretch/>
         </p:blipFill>
         <p:spPr>
           <a:xfrm>
-            <a:off x="4758135" y="1753726"/>
-            <a:ext cx="2860579" cy="2335578"/>
+            <a:off x="4758135" y="1814743"/>
+            <a:ext cx="2860579" cy="2213543"/>
           </a:xfrm>
           <a:prstGeom prst="rect">
             <a:avLst/>
@@ -18989,150 +18977,6 @@
       </p:pic>
       <p:grpSp>
         <p:nvGrpSpPr>
-          <p:cNvPr id="27" name="Grupo 26">
-            <a:extLst>
-              <a:ext uri="{FF2B5EF4-FFF2-40B4-BE49-F238E27FC236}">
-                <a16:creationId xmlns:a16="http://schemas.microsoft.com/office/drawing/2014/main" id="{464E5119-ACAC-15E1-AD4D-847E42B12C9C}"/>
-              </a:ext>
-            </a:extLst>
-          </p:cNvPr>
-          <p:cNvGrpSpPr/>
-          <p:nvPr/>
-        </p:nvGrpSpPr>
-        <p:grpSpPr>
-          <a:xfrm>
-            <a:off x="3757717" y="3348634"/>
-            <a:ext cx="2316036" cy="934914"/>
-            <a:chOff x="3757717" y="3183710"/>
-            <a:chExt cx="2316036" cy="934914"/>
-          </a:xfrm>
-        </p:grpSpPr>
-        <p:sp>
-          <p:nvSpPr>
-            <p:cNvPr id="17" name="Forma libre: forma 16">
-              <a:extLst>
-                <a:ext uri="{FF2B5EF4-FFF2-40B4-BE49-F238E27FC236}">
-                  <a16:creationId xmlns:a16="http://schemas.microsoft.com/office/drawing/2014/main" id="{8CB31E86-DB71-0F5B-397D-5FA24D4BAEDF}"/>
-                </a:ext>
-              </a:extLst>
-            </p:cNvPr>
-            <p:cNvSpPr/>
-            <p:nvPr/>
-          </p:nvSpPr>
-          <p:spPr>
-            <a:xfrm>
-              <a:off x="3757717" y="3277354"/>
-              <a:ext cx="2262639" cy="841270"/>
-            </a:xfrm>
-            <a:custGeom>
-              <a:avLst/>
-              <a:gdLst>
-                <a:gd name="connsiteX0" fmla="*/ 0 w 2275989"/>
-                <a:gd name="connsiteY0" fmla="*/ 347072 h 901538"/>
-                <a:gd name="connsiteX1" fmla="*/ 1481729 w 2275989"/>
-                <a:gd name="connsiteY1" fmla="*/ 894377 h 901538"/>
-                <a:gd name="connsiteX2" fmla="*/ 2275989 w 2275989"/>
-                <a:gd name="connsiteY2" fmla="*/ 0 h 901538"/>
-              </a:gdLst>
-              <a:ahLst/>
-              <a:cxnLst>
-                <a:cxn ang="0">
-                  <a:pos x="connsiteX0" y="connsiteY0"/>
-                </a:cxn>
-                <a:cxn ang="0">
-                  <a:pos x="connsiteX1" y="connsiteY1"/>
-                </a:cxn>
-                <a:cxn ang="0">
-                  <a:pos x="connsiteX2" y="connsiteY2"/>
-                </a:cxn>
-              </a:cxnLst>
-              <a:rect l="l" t="t" r="r" b="b"/>
-              <a:pathLst>
-                <a:path w="2275989" h="901538">
-                  <a:moveTo>
-                    <a:pt x="0" y="347072"/>
-                  </a:moveTo>
-                  <a:cubicBezTo>
-                    <a:pt x="551199" y="649647"/>
-                    <a:pt x="1102398" y="952222"/>
-                    <a:pt x="1481729" y="894377"/>
-                  </a:cubicBezTo>
-                  <a:cubicBezTo>
-                    <a:pt x="1861060" y="836532"/>
-                    <a:pt x="2068524" y="418266"/>
-                    <a:pt x="2275989" y="0"/>
-                  </a:cubicBezTo>
-                </a:path>
-              </a:pathLst>
-            </a:custGeom>
-          </p:spPr>
-          <p:style>
-            <a:lnRef idx="1">
-              <a:schemeClr val="accent2"/>
-            </a:lnRef>
-            <a:fillRef idx="0">
-              <a:schemeClr val="accent2"/>
-            </a:fillRef>
-            <a:effectRef idx="0">
-              <a:schemeClr val="accent2"/>
-            </a:effectRef>
-            <a:fontRef idx="minor">
-              <a:schemeClr val="tx1"/>
-            </a:fontRef>
-          </p:style>
-          <p:txBody>
-            <a:bodyPr rtlCol="0" anchor="ctr"/>
-            <a:lstStyle/>
-            <a:p>
-              <a:pPr algn="ctr"/>
-              <a:endParaRPr lang="es-CO"/>
-            </a:p>
-          </p:txBody>
-        </p:sp>
-        <p:cxnSp>
-          <p:nvCxnSpPr>
-            <p:cNvPr id="19" name="Conector recto de flecha 18">
-              <a:extLst>
-                <a:ext uri="{FF2B5EF4-FFF2-40B4-BE49-F238E27FC236}">
-                  <a16:creationId xmlns:a16="http://schemas.microsoft.com/office/drawing/2014/main" id="{1FB6B856-6431-0754-0685-A1B278DF3F22}"/>
-                </a:ext>
-              </a:extLst>
-            </p:cNvPr>
-            <p:cNvCxnSpPr>
-              <a:cxnSpLocks/>
-            </p:cNvCxnSpPr>
-            <p:nvPr/>
-          </p:nvCxnSpPr>
-          <p:spPr>
-            <a:xfrm flipV="1">
-              <a:off x="6020358" y="3183710"/>
-              <a:ext cx="53395" cy="93442"/>
-            </a:xfrm>
-            <a:prstGeom prst="straightConnector1">
-              <a:avLst/>
-            </a:prstGeom>
-            <a:ln w="6350">
-              <a:tailEnd type="triangle"/>
-            </a:ln>
-          </p:spPr>
-          <p:style>
-            <a:lnRef idx="2">
-              <a:schemeClr val="accent2"/>
-            </a:lnRef>
-            <a:fillRef idx="0">
-              <a:schemeClr val="accent2"/>
-            </a:fillRef>
-            <a:effectRef idx="1">
-              <a:schemeClr val="accent2"/>
-            </a:effectRef>
-            <a:fontRef idx="minor">
-              <a:schemeClr val="tx1"/>
-            </a:fontRef>
-          </p:style>
-        </p:cxnSp>
-      </p:grpSp>
-      <p:grpSp>
-        <p:nvGrpSpPr>
           <p:cNvPr id="26" name="Grupo 25">
             <a:extLst>
               <a:ext uri="{FF2B5EF4-FFF2-40B4-BE49-F238E27FC236}">
@@ -19144,9 +18988,9 @@
           <p:nvPr/>
         </p:nvGrpSpPr>
         <p:grpSpPr>
-          <a:xfrm>
-            <a:off x="3759276" y="1566409"/>
-            <a:ext cx="2373215" cy="620881"/>
+          <a:xfrm rot="422728">
+            <a:off x="3795927" y="1618608"/>
+            <a:ext cx="2285824" cy="620881"/>
             <a:chOff x="3759276" y="1428181"/>
             <a:chExt cx="2373215" cy="620881"/>
           </a:xfrm>
@@ -19275,6 +19119,157 @@
           </p:style>
         </p:cxnSp>
       </p:grpSp>
+      <p:grpSp>
+        <p:nvGrpSpPr>
+          <p:cNvPr id="25" name="Grupo 24">
+            <a:extLst>
+              <a:ext uri="{FF2B5EF4-FFF2-40B4-BE49-F238E27FC236}">
+                <a16:creationId xmlns:a16="http://schemas.microsoft.com/office/drawing/2014/main" id="{030F864D-B33F-41C8-A92F-FD3B2B3BA7C9}"/>
+              </a:ext>
+            </a:extLst>
+          </p:cNvPr>
+          <p:cNvGrpSpPr/>
+          <p:nvPr/>
+        </p:nvGrpSpPr>
+        <p:grpSpPr>
+          <a:xfrm>
+            <a:off x="3762375" y="3487971"/>
+            <a:ext cx="2251046" cy="723942"/>
+            <a:chOff x="3762375" y="3487971"/>
+            <a:chExt cx="2251046" cy="723942"/>
+          </a:xfrm>
+        </p:grpSpPr>
+        <p:sp>
+          <p:nvSpPr>
+            <p:cNvPr id="21" name="Forma libre: forma 20">
+              <a:extLst>
+                <a:ext uri="{FF2B5EF4-FFF2-40B4-BE49-F238E27FC236}">
+                  <a16:creationId xmlns:a16="http://schemas.microsoft.com/office/drawing/2014/main" id="{49F54590-41B7-4F7A-B598-20BA0F6A7BC5}"/>
+                </a:ext>
+              </a:extLst>
+            </p:cNvPr>
+            <p:cNvSpPr/>
+            <p:nvPr/>
+          </p:nvSpPr>
+          <p:spPr>
+            <a:xfrm>
+              <a:off x="3762375" y="3533775"/>
+              <a:ext cx="2247900" cy="678138"/>
+            </a:xfrm>
+            <a:custGeom>
+              <a:avLst/>
+              <a:gdLst>
+                <a:gd name="connsiteX0" fmla="*/ 0 w 2247900"/>
+                <a:gd name="connsiteY0" fmla="*/ 161925 h 678138"/>
+                <a:gd name="connsiteX1" fmla="*/ 1828800 w 2247900"/>
+                <a:gd name="connsiteY1" fmla="*/ 676275 h 678138"/>
+                <a:gd name="connsiteX2" fmla="*/ 2247900 w 2247900"/>
+                <a:gd name="connsiteY2" fmla="*/ 0 h 678138"/>
+              </a:gdLst>
+              <a:ahLst/>
+              <a:cxnLst>
+                <a:cxn ang="0">
+                  <a:pos x="connsiteX0" y="connsiteY0"/>
+                </a:cxn>
+                <a:cxn ang="0">
+                  <a:pos x="connsiteX1" y="connsiteY1"/>
+                </a:cxn>
+                <a:cxn ang="0">
+                  <a:pos x="connsiteX2" y="connsiteY2"/>
+                </a:cxn>
+              </a:cxnLst>
+              <a:rect l="l" t="t" r="r" b="b"/>
+              <a:pathLst>
+                <a:path w="2247900" h="678138">
+                  <a:moveTo>
+                    <a:pt x="0" y="161925"/>
+                  </a:moveTo>
+                  <a:cubicBezTo>
+                    <a:pt x="727075" y="432593"/>
+                    <a:pt x="1454150" y="703262"/>
+                    <a:pt x="1828800" y="676275"/>
+                  </a:cubicBezTo>
+                  <a:cubicBezTo>
+                    <a:pt x="2203450" y="649288"/>
+                    <a:pt x="2225675" y="324644"/>
+                    <a:pt x="2247900" y="0"/>
+                  </a:cubicBezTo>
+                </a:path>
+              </a:pathLst>
+            </a:custGeom>
+            <a:noFill/>
+            <a:ln>
+              <a:solidFill>
+                <a:schemeClr val="accent2"/>
+              </a:solidFill>
+            </a:ln>
+            <a:effectLst/>
+          </p:spPr>
+          <p:style>
+            <a:lnRef idx="1">
+              <a:schemeClr val="accent1"/>
+            </a:lnRef>
+            <a:fillRef idx="3">
+              <a:schemeClr val="accent1"/>
+            </a:fillRef>
+            <a:effectRef idx="2">
+              <a:schemeClr val="accent1"/>
+            </a:effectRef>
+            <a:fontRef idx="minor">
+              <a:schemeClr val="lt1"/>
+            </a:fontRef>
+          </p:style>
+          <p:txBody>
+            <a:bodyPr rtlCol="0" anchor="ctr"/>
+            <a:lstStyle/>
+            <a:p>
+              <a:pPr algn="ctr"/>
+              <a:endParaRPr lang="es-CO"/>
+            </a:p>
+          </p:txBody>
+        </p:sp>
+        <p:cxnSp>
+          <p:nvCxnSpPr>
+            <p:cNvPr id="28" name="Conector recto de flecha 27">
+              <a:extLst>
+                <a:ext uri="{FF2B5EF4-FFF2-40B4-BE49-F238E27FC236}">
+                  <a16:creationId xmlns:a16="http://schemas.microsoft.com/office/drawing/2014/main" id="{61C92897-12C8-4138-A08F-8DF6103E3370}"/>
+                </a:ext>
+              </a:extLst>
+            </p:cNvPr>
+            <p:cNvCxnSpPr>
+              <a:cxnSpLocks/>
+            </p:cNvCxnSpPr>
+            <p:nvPr/>
+          </p:nvCxnSpPr>
+          <p:spPr>
+            <a:xfrm flipV="1">
+              <a:off x="6008294" y="3487971"/>
+              <a:ext cx="5127" cy="110134"/>
+            </a:xfrm>
+            <a:prstGeom prst="straightConnector1">
+              <a:avLst/>
+            </a:prstGeom>
+            <a:ln w="6350">
+              <a:tailEnd type="triangle"/>
+            </a:ln>
+          </p:spPr>
+          <p:style>
+            <a:lnRef idx="2">
+              <a:schemeClr val="accent2"/>
+            </a:lnRef>
+            <a:fillRef idx="0">
+              <a:schemeClr val="accent2"/>
+            </a:fillRef>
+            <a:effectRef idx="1">
+              <a:schemeClr val="accent2"/>
+            </a:effectRef>
+            <a:fontRef idx="minor">
+              <a:schemeClr val="tx1"/>
+            </a:fontRef>
+          </p:style>
+        </p:cxnSp>
+      </p:grpSp>
     </p:spTree>
     <p:extLst>
       <p:ext uri="{BB962C8B-B14F-4D97-AF65-F5344CB8AC3E}">
@@ -19456,7 +19451,7 @@
                                           </p:stCondLst>
                                         </p:cTn>
                                         <p:tgtEl>
-                                          <p:spTgt spid="27"/>
+                                          <p:spTgt spid="25"/>
                                         </p:tgtEl>
                                         <p:attrNameLst>
                                           <p:attrName>style.visibility</p:attrName>
@@ -19470,7 +19465,7 @@
                                       <p:cBhvr>
                                         <p:cTn id="17" dur="750"/>
                                         <p:tgtEl>
-                                          <p:spTgt spid="27"/>
+                                          <p:spTgt spid="25"/>
                                         </p:tgtEl>
                                       </p:cBhvr>
                                     </p:animEffect>

</xml_diff>